<commit_message>
Update Capstone Project Slide Presentation.pptx
</commit_message>
<xml_diff>
--- a/Capstone Project Slide Presentation.pptx
+++ b/Capstone Project Slide Presentation.pptx
@@ -3868,7 +3868,7 @@
           <a:p>
             <a:fld id="{D3D75092-268E-7A48-B839-B7BEE5A4CE6A}" type="datetimeFigureOut">
               <a:rPr lang="en-US" smtClean="0"/>
-              <a:t>3/22/2024</a:t>
+              <a:t>3/23/2024</a:t>
             </a:fld>
             <a:endParaRPr lang="en-US"/>
           </a:p>
@@ -4285,7 +4285,7 @@
           <a:p>
             <a:fld id="{74AB1E61-4AB3-964A-8E1A-AF59C6397F89}" type="datetime1">
               <a:rPr lang="en-MY" smtClean="0"/>
-              <a:t>22/3/2024</a:t>
+              <a:t>23/3/2024</a:t>
             </a:fld>
             <a:endParaRPr lang="en-US"/>
           </a:p>
@@ -4485,7 +4485,7 @@
           <a:p>
             <a:fld id="{D141F3CC-2B06-2C46-88E6-0BE336749D53}" type="datetime1">
               <a:rPr lang="en-MY" smtClean="0"/>
-              <a:t>22/3/2024</a:t>
+              <a:t>23/3/2024</a:t>
             </a:fld>
             <a:endParaRPr lang="en-US"/>
           </a:p>
@@ -4695,7 +4695,7 @@
           <a:p>
             <a:fld id="{EDF1ED3D-6CBB-3C40-8BA5-88531CC20B7B}" type="datetime1">
               <a:rPr lang="en-MY" smtClean="0"/>
-              <a:t>22/3/2024</a:t>
+              <a:t>23/3/2024</a:t>
             </a:fld>
             <a:endParaRPr lang="en-US"/>
           </a:p>
@@ -4895,7 +4895,7 @@
           <a:p>
             <a:fld id="{705E46A3-81A8-754C-A576-1C7AC117F338}" type="datetime1">
               <a:rPr lang="en-MY" smtClean="0"/>
-              <a:t>22/3/2024</a:t>
+              <a:t>23/3/2024</a:t>
             </a:fld>
             <a:endParaRPr lang="en-US"/>
           </a:p>
@@ -5171,7 +5171,7 @@
           <a:p>
             <a:fld id="{1F1FB5D9-B905-6E4B-AE1A-F6788868F974}" type="datetime1">
               <a:rPr lang="en-MY" smtClean="0"/>
-              <a:t>22/3/2024</a:t>
+              <a:t>23/3/2024</a:t>
             </a:fld>
             <a:endParaRPr lang="en-US"/>
           </a:p>
@@ -5439,7 +5439,7 @@
           <a:p>
             <a:fld id="{EA1E5FB7-96BA-1A41-991B-03F500C3500C}" type="datetime1">
               <a:rPr lang="en-MY" smtClean="0"/>
-              <a:t>22/3/2024</a:t>
+              <a:t>23/3/2024</a:t>
             </a:fld>
             <a:endParaRPr lang="en-US"/>
           </a:p>
@@ -5854,7 +5854,7 @@
           <a:p>
             <a:fld id="{32368AA9-95F5-8F41-BEBE-E9C96302A193}" type="datetime1">
               <a:rPr lang="en-MY" smtClean="0"/>
-              <a:t>22/3/2024</a:t>
+              <a:t>23/3/2024</a:t>
             </a:fld>
             <a:endParaRPr lang="en-US"/>
           </a:p>
@@ -5996,7 +5996,7 @@
           <a:p>
             <a:fld id="{80500D2A-26A3-B249-BC2A-9B4BE9464361}" type="datetime1">
               <a:rPr lang="en-MY" smtClean="0"/>
-              <a:t>22/3/2024</a:t>
+              <a:t>23/3/2024</a:t>
             </a:fld>
             <a:endParaRPr lang="en-US"/>
           </a:p>
@@ -6109,7 +6109,7 @@
           <a:p>
             <a:fld id="{E856614B-4108-4D4A-A796-97E0CB9C1977}" type="datetime1">
               <a:rPr lang="en-MY" smtClean="0"/>
-              <a:t>22/3/2024</a:t>
+              <a:t>23/3/2024</a:t>
             </a:fld>
             <a:endParaRPr lang="en-US"/>
           </a:p>
@@ -6422,7 +6422,7 @@
           <a:p>
             <a:fld id="{63D06F8A-8BCF-D143-B6B2-5F810606A215}" type="datetime1">
               <a:rPr lang="en-MY" smtClean="0"/>
-              <a:t>22/3/2024</a:t>
+              <a:t>23/3/2024</a:t>
             </a:fld>
             <a:endParaRPr lang="en-US"/>
           </a:p>
@@ -6711,7 +6711,7 @@
           <a:p>
             <a:fld id="{51B510F5-F66C-D242-A6B1-6B560780126B}" type="datetime1">
               <a:rPr lang="en-MY" smtClean="0"/>
-              <a:t>22/3/2024</a:t>
+              <a:t>23/3/2024</a:t>
             </a:fld>
             <a:endParaRPr lang="en-US"/>
           </a:p>
@@ -6987,7 +6987,7 @@
           <a:p>
             <a:fld id="{7D037FDC-C959-D34A-B938-199E8760A89C}" type="datetime1">
               <a:rPr lang="en-MY" smtClean="0"/>
-              <a:t>22/3/2024</a:t>
+              <a:t>23/3/2024</a:t>
             </a:fld>
             <a:endParaRPr lang="en-US"/>
           </a:p>
@@ -8725,6 +8725,345 @@
   <p:clrMapOvr>
     <a:masterClrMapping/>
   </p:clrMapOvr>
+  <p:timing>
+    <p:tnLst>
+      <p:par>
+        <p:cTn id="1" dur="indefinite" restart="never" nodeType="tmRoot">
+          <p:childTnLst>
+            <p:seq concurrent="1" nextAc="seek">
+              <p:cTn id="2" dur="indefinite" nodeType="mainSeq">
+                <p:childTnLst>
+                  <p:par>
+                    <p:cTn id="3" fill="hold">
+                      <p:stCondLst>
+                        <p:cond delay="indefinite"/>
+                      </p:stCondLst>
+                      <p:childTnLst>
+                        <p:par>
+                          <p:cTn id="4" fill="hold">
+                            <p:stCondLst>
+                              <p:cond delay="0"/>
+                            </p:stCondLst>
+                            <p:childTnLst>
+                              <p:par>
+                                <p:cTn id="5" presetID="2" presetClass="entr" presetSubtype="4" fill="hold" nodeType="clickEffect">
+                                  <p:stCondLst>
+                                    <p:cond delay="0"/>
+                                  </p:stCondLst>
+                                  <p:childTnLst>
+                                    <p:set>
+                                      <p:cBhvr>
+                                        <p:cTn id="6" dur="1" fill="hold">
+                                          <p:stCondLst>
+                                            <p:cond delay="0"/>
+                                          </p:stCondLst>
+                                        </p:cTn>
+                                        <p:tgtEl>
+                                          <p:spTgt spid="3">
+                                            <p:txEl>
+                                              <p:pRg st="0" end="0"/>
+                                            </p:txEl>
+                                          </p:spTgt>
+                                        </p:tgtEl>
+                                        <p:attrNameLst>
+                                          <p:attrName>style.visibility</p:attrName>
+                                        </p:attrNameLst>
+                                      </p:cBhvr>
+                                      <p:to>
+                                        <p:strVal val="visible"/>
+                                      </p:to>
+                                    </p:set>
+                                    <p:anim calcmode="lin" valueType="num">
+                                      <p:cBhvr additive="base">
+                                        <p:cTn id="7" dur="500" fill="hold"/>
+                                        <p:tgtEl>
+                                          <p:spTgt spid="3">
+                                            <p:txEl>
+                                              <p:pRg st="0" end="0"/>
+                                            </p:txEl>
+                                          </p:spTgt>
+                                        </p:tgtEl>
+                                        <p:attrNameLst>
+                                          <p:attrName>ppt_x</p:attrName>
+                                        </p:attrNameLst>
+                                      </p:cBhvr>
+                                      <p:tavLst>
+                                        <p:tav tm="0">
+                                          <p:val>
+                                            <p:strVal val="#ppt_x"/>
+                                          </p:val>
+                                        </p:tav>
+                                        <p:tav tm="100000">
+                                          <p:val>
+                                            <p:strVal val="#ppt_x"/>
+                                          </p:val>
+                                        </p:tav>
+                                      </p:tavLst>
+                                    </p:anim>
+                                    <p:anim calcmode="lin" valueType="num">
+                                      <p:cBhvr additive="base">
+                                        <p:cTn id="8" dur="500" fill="hold"/>
+                                        <p:tgtEl>
+                                          <p:spTgt spid="3">
+                                            <p:txEl>
+                                              <p:pRg st="0" end="0"/>
+                                            </p:txEl>
+                                          </p:spTgt>
+                                        </p:tgtEl>
+                                        <p:attrNameLst>
+                                          <p:attrName>ppt_y</p:attrName>
+                                        </p:attrNameLst>
+                                      </p:cBhvr>
+                                      <p:tavLst>
+                                        <p:tav tm="0">
+                                          <p:val>
+                                            <p:strVal val="1+#ppt_h/2"/>
+                                          </p:val>
+                                        </p:tav>
+                                        <p:tav tm="100000">
+                                          <p:val>
+                                            <p:strVal val="#ppt_y"/>
+                                          </p:val>
+                                        </p:tav>
+                                      </p:tavLst>
+                                    </p:anim>
+                                  </p:childTnLst>
+                                </p:cTn>
+                              </p:par>
+                            </p:childTnLst>
+                          </p:cTn>
+                        </p:par>
+                      </p:childTnLst>
+                    </p:cTn>
+                  </p:par>
+                  <p:par>
+                    <p:cTn id="9" fill="hold">
+                      <p:stCondLst>
+                        <p:cond delay="indefinite"/>
+                      </p:stCondLst>
+                      <p:childTnLst>
+                        <p:par>
+                          <p:cTn id="10" fill="hold">
+                            <p:stCondLst>
+                              <p:cond delay="0"/>
+                            </p:stCondLst>
+                            <p:childTnLst>
+                              <p:par>
+                                <p:cTn id="11" presetID="2" presetClass="entr" presetSubtype="4" fill="hold" nodeType="clickEffect">
+                                  <p:stCondLst>
+                                    <p:cond delay="0"/>
+                                  </p:stCondLst>
+                                  <p:childTnLst>
+                                    <p:set>
+                                      <p:cBhvr>
+                                        <p:cTn id="12" dur="1" fill="hold">
+                                          <p:stCondLst>
+                                            <p:cond delay="0"/>
+                                          </p:stCondLst>
+                                        </p:cTn>
+                                        <p:tgtEl>
+                                          <p:spTgt spid="3">
+                                            <p:txEl>
+                                              <p:pRg st="1" end="1"/>
+                                            </p:txEl>
+                                          </p:spTgt>
+                                        </p:tgtEl>
+                                        <p:attrNameLst>
+                                          <p:attrName>style.visibility</p:attrName>
+                                        </p:attrNameLst>
+                                      </p:cBhvr>
+                                      <p:to>
+                                        <p:strVal val="visible"/>
+                                      </p:to>
+                                    </p:set>
+                                    <p:anim calcmode="lin" valueType="num">
+                                      <p:cBhvr additive="base">
+                                        <p:cTn id="13" dur="500" fill="hold"/>
+                                        <p:tgtEl>
+                                          <p:spTgt spid="3">
+                                            <p:txEl>
+                                              <p:pRg st="1" end="1"/>
+                                            </p:txEl>
+                                          </p:spTgt>
+                                        </p:tgtEl>
+                                        <p:attrNameLst>
+                                          <p:attrName>ppt_x</p:attrName>
+                                        </p:attrNameLst>
+                                      </p:cBhvr>
+                                      <p:tavLst>
+                                        <p:tav tm="0">
+                                          <p:val>
+                                            <p:strVal val="#ppt_x"/>
+                                          </p:val>
+                                        </p:tav>
+                                        <p:tav tm="100000">
+                                          <p:val>
+                                            <p:strVal val="#ppt_x"/>
+                                          </p:val>
+                                        </p:tav>
+                                      </p:tavLst>
+                                    </p:anim>
+                                    <p:anim calcmode="lin" valueType="num">
+                                      <p:cBhvr additive="base">
+                                        <p:cTn id="14" dur="500" fill="hold"/>
+                                        <p:tgtEl>
+                                          <p:spTgt spid="3">
+                                            <p:txEl>
+                                              <p:pRg st="1" end="1"/>
+                                            </p:txEl>
+                                          </p:spTgt>
+                                        </p:tgtEl>
+                                        <p:attrNameLst>
+                                          <p:attrName>ppt_y</p:attrName>
+                                        </p:attrNameLst>
+                                      </p:cBhvr>
+                                      <p:tavLst>
+                                        <p:tav tm="0">
+                                          <p:val>
+                                            <p:strVal val="1+#ppt_h/2"/>
+                                          </p:val>
+                                        </p:tav>
+                                        <p:tav tm="100000">
+                                          <p:val>
+                                            <p:strVal val="#ppt_y"/>
+                                          </p:val>
+                                        </p:tav>
+                                      </p:tavLst>
+                                    </p:anim>
+                                  </p:childTnLst>
+                                </p:cTn>
+                              </p:par>
+                            </p:childTnLst>
+                          </p:cTn>
+                        </p:par>
+                      </p:childTnLst>
+                    </p:cTn>
+                  </p:par>
+                  <p:par>
+                    <p:cTn id="15" fill="hold">
+                      <p:stCondLst>
+                        <p:cond delay="indefinite"/>
+                      </p:stCondLst>
+                      <p:childTnLst>
+                        <p:par>
+                          <p:cTn id="16" fill="hold">
+                            <p:stCondLst>
+                              <p:cond delay="0"/>
+                            </p:stCondLst>
+                            <p:childTnLst>
+                              <p:par>
+                                <p:cTn id="17" presetID="2" presetClass="entr" presetSubtype="4" fill="hold" nodeType="clickEffect">
+                                  <p:stCondLst>
+                                    <p:cond delay="0"/>
+                                  </p:stCondLst>
+                                  <p:childTnLst>
+                                    <p:set>
+                                      <p:cBhvr>
+                                        <p:cTn id="18" dur="1" fill="hold">
+                                          <p:stCondLst>
+                                            <p:cond delay="0"/>
+                                          </p:stCondLst>
+                                        </p:cTn>
+                                        <p:tgtEl>
+                                          <p:spTgt spid="3">
+                                            <p:txEl>
+                                              <p:pRg st="2" end="2"/>
+                                            </p:txEl>
+                                          </p:spTgt>
+                                        </p:tgtEl>
+                                        <p:attrNameLst>
+                                          <p:attrName>style.visibility</p:attrName>
+                                        </p:attrNameLst>
+                                      </p:cBhvr>
+                                      <p:to>
+                                        <p:strVal val="visible"/>
+                                      </p:to>
+                                    </p:set>
+                                    <p:anim calcmode="lin" valueType="num">
+                                      <p:cBhvr additive="base">
+                                        <p:cTn id="19" dur="500" fill="hold"/>
+                                        <p:tgtEl>
+                                          <p:spTgt spid="3">
+                                            <p:txEl>
+                                              <p:pRg st="2" end="2"/>
+                                            </p:txEl>
+                                          </p:spTgt>
+                                        </p:tgtEl>
+                                        <p:attrNameLst>
+                                          <p:attrName>ppt_x</p:attrName>
+                                        </p:attrNameLst>
+                                      </p:cBhvr>
+                                      <p:tavLst>
+                                        <p:tav tm="0">
+                                          <p:val>
+                                            <p:strVal val="#ppt_x"/>
+                                          </p:val>
+                                        </p:tav>
+                                        <p:tav tm="100000">
+                                          <p:val>
+                                            <p:strVal val="#ppt_x"/>
+                                          </p:val>
+                                        </p:tav>
+                                      </p:tavLst>
+                                    </p:anim>
+                                    <p:anim calcmode="lin" valueType="num">
+                                      <p:cBhvr additive="base">
+                                        <p:cTn id="20" dur="500" fill="hold"/>
+                                        <p:tgtEl>
+                                          <p:spTgt spid="3">
+                                            <p:txEl>
+                                              <p:pRg st="2" end="2"/>
+                                            </p:txEl>
+                                          </p:spTgt>
+                                        </p:tgtEl>
+                                        <p:attrNameLst>
+                                          <p:attrName>ppt_y</p:attrName>
+                                        </p:attrNameLst>
+                                      </p:cBhvr>
+                                      <p:tavLst>
+                                        <p:tav tm="0">
+                                          <p:val>
+                                            <p:strVal val="1+#ppt_h/2"/>
+                                          </p:val>
+                                        </p:tav>
+                                        <p:tav tm="100000">
+                                          <p:val>
+                                            <p:strVal val="#ppt_y"/>
+                                          </p:val>
+                                        </p:tav>
+                                      </p:tavLst>
+                                    </p:anim>
+                                  </p:childTnLst>
+                                </p:cTn>
+                              </p:par>
+                            </p:childTnLst>
+                          </p:cTn>
+                        </p:par>
+                      </p:childTnLst>
+                    </p:cTn>
+                  </p:par>
+                </p:childTnLst>
+              </p:cTn>
+              <p:prevCondLst>
+                <p:cond evt="onPrev" delay="0">
+                  <p:tgtEl>
+                    <p:sldTgt/>
+                  </p:tgtEl>
+                </p:cond>
+              </p:prevCondLst>
+              <p:nextCondLst>
+                <p:cond evt="onNext" delay="0">
+                  <p:tgtEl>
+                    <p:sldTgt/>
+                  </p:tgtEl>
+                </p:cond>
+              </p:nextCondLst>
+            </p:seq>
+          </p:childTnLst>
+        </p:cTn>
+      </p:par>
+    </p:tnLst>
+  </p:timing>
 </p:sld>
 </file>
 
@@ -8863,6 +9202,448 @@
   <p:clrMapOvr>
     <a:masterClrMapping/>
   </p:clrMapOvr>
+  <p:timing>
+    <p:tnLst>
+      <p:par>
+        <p:cTn id="1" dur="indefinite" restart="never" nodeType="tmRoot">
+          <p:childTnLst>
+            <p:seq concurrent="1" nextAc="seek">
+              <p:cTn id="2" dur="indefinite" nodeType="mainSeq">
+                <p:childTnLst>
+                  <p:par>
+                    <p:cTn id="3" fill="hold">
+                      <p:stCondLst>
+                        <p:cond delay="indefinite"/>
+                      </p:stCondLst>
+                      <p:childTnLst>
+                        <p:par>
+                          <p:cTn id="4" fill="hold">
+                            <p:stCondLst>
+                              <p:cond delay="0"/>
+                            </p:stCondLst>
+                            <p:childTnLst>
+                              <p:par>
+                                <p:cTn id="5" presetID="2" presetClass="entr" presetSubtype="4" fill="hold" nodeType="clickEffect">
+                                  <p:stCondLst>
+                                    <p:cond delay="0"/>
+                                  </p:stCondLst>
+                                  <p:childTnLst>
+                                    <p:set>
+                                      <p:cBhvr>
+                                        <p:cTn id="6" dur="1" fill="hold">
+                                          <p:stCondLst>
+                                            <p:cond delay="0"/>
+                                          </p:stCondLst>
+                                        </p:cTn>
+                                        <p:tgtEl>
+                                          <p:spTgt spid="3">
+                                            <p:txEl>
+                                              <p:pRg st="0" end="0"/>
+                                            </p:txEl>
+                                          </p:spTgt>
+                                        </p:tgtEl>
+                                        <p:attrNameLst>
+                                          <p:attrName>style.visibility</p:attrName>
+                                        </p:attrNameLst>
+                                      </p:cBhvr>
+                                      <p:to>
+                                        <p:strVal val="visible"/>
+                                      </p:to>
+                                    </p:set>
+                                    <p:anim calcmode="lin" valueType="num">
+                                      <p:cBhvr additive="base">
+                                        <p:cTn id="7" dur="500" fill="hold"/>
+                                        <p:tgtEl>
+                                          <p:spTgt spid="3">
+                                            <p:txEl>
+                                              <p:pRg st="0" end="0"/>
+                                            </p:txEl>
+                                          </p:spTgt>
+                                        </p:tgtEl>
+                                        <p:attrNameLst>
+                                          <p:attrName>ppt_x</p:attrName>
+                                        </p:attrNameLst>
+                                      </p:cBhvr>
+                                      <p:tavLst>
+                                        <p:tav tm="0">
+                                          <p:val>
+                                            <p:strVal val="#ppt_x"/>
+                                          </p:val>
+                                        </p:tav>
+                                        <p:tav tm="100000">
+                                          <p:val>
+                                            <p:strVal val="#ppt_x"/>
+                                          </p:val>
+                                        </p:tav>
+                                      </p:tavLst>
+                                    </p:anim>
+                                    <p:anim calcmode="lin" valueType="num">
+                                      <p:cBhvr additive="base">
+                                        <p:cTn id="8" dur="500" fill="hold"/>
+                                        <p:tgtEl>
+                                          <p:spTgt spid="3">
+                                            <p:txEl>
+                                              <p:pRg st="0" end="0"/>
+                                            </p:txEl>
+                                          </p:spTgt>
+                                        </p:tgtEl>
+                                        <p:attrNameLst>
+                                          <p:attrName>ppt_y</p:attrName>
+                                        </p:attrNameLst>
+                                      </p:cBhvr>
+                                      <p:tavLst>
+                                        <p:tav tm="0">
+                                          <p:val>
+                                            <p:strVal val="1+#ppt_h/2"/>
+                                          </p:val>
+                                        </p:tav>
+                                        <p:tav tm="100000">
+                                          <p:val>
+                                            <p:strVal val="#ppt_y"/>
+                                          </p:val>
+                                        </p:tav>
+                                      </p:tavLst>
+                                    </p:anim>
+                                  </p:childTnLst>
+                                </p:cTn>
+                              </p:par>
+                            </p:childTnLst>
+                          </p:cTn>
+                        </p:par>
+                      </p:childTnLst>
+                    </p:cTn>
+                  </p:par>
+                  <p:par>
+                    <p:cTn id="9" fill="hold">
+                      <p:stCondLst>
+                        <p:cond delay="indefinite"/>
+                      </p:stCondLst>
+                      <p:childTnLst>
+                        <p:par>
+                          <p:cTn id="10" fill="hold">
+                            <p:stCondLst>
+                              <p:cond delay="0"/>
+                            </p:stCondLst>
+                            <p:childTnLst>
+                              <p:par>
+                                <p:cTn id="11" presetID="2" presetClass="entr" presetSubtype="4" fill="hold" nodeType="clickEffect">
+                                  <p:stCondLst>
+                                    <p:cond delay="0"/>
+                                  </p:stCondLst>
+                                  <p:childTnLst>
+                                    <p:set>
+                                      <p:cBhvr>
+                                        <p:cTn id="12" dur="1" fill="hold">
+                                          <p:stCondLst>
+                                            <p:cond delay="0"/>
+                                          </p:stCondLst>
+                                        </p:cTn>
+                                        <p:tgtEl>
+                                          <p:spTgt spid="3">
+                                            <p:txEl>
+                                              <p:pRg st="1" end="1"/>
+                                            </p:txEl>
+                                          </p:spTgt>
+                                        </p:tgtEl>
+                                        <p:attrNameLst>
+                                          <p:attrName>style.visibility</p:attrName>
+                                        </p:attrNameLst>
+                                      </p:cBhvr>
+                                      <p:to>
+                                        <p:strVal val="visible"/>
+                                      </p:to>
+                                    </p:set>
+                                    <p:anim calcmode="lin" valueType="num">
+                                      <p:cBhvr additive="base">
+                                        <p:cTn id="13" dur="500" fill="hold"/>
+                                        <p:tgtEl>
+                                          <p:spTgt spid="3">
+                                            <p:txEl>
+                                              <p:pRg st="1" end="1"/>
+                                            </p:txEl>
+                                          </p:spTgt>
+                                        </p:tgtEl>
+                                        <p:attrNameLst>
+                                          <p:attrName>ppt_x</p:attrName>
+                                        </p:attrNameLst>
+                                      </p:cBhvr>
+                                      <p:tavLst>
+                                        <p:tav tm="0">
+                                          <p:val>
+                                            <p:strVal val="#ppt_x"/>
+                                          </p:val>
+                                        </p:tav>
+                                        <p:tav tm="100000">
+                                          <p:val>
+                                            <p:strVal val="#ppt_x"/>
+                                          </p:val>
+                                        </p:tav>
+                                      </p:tavLst>
+                                    </p:anim>
+                                    <p:anim calcmode="lin" valueType="num">
+                                      <p:cBhvr additive="base">
+                                        <p:cTn id="14" dur="500" fill="hold"/>
+                                        <p:tgtEl>
+                                          <p:spTgt spid="3">
+                                            <p:txEl>
+                                              <p:pRg st="1" end="1"/>
+                                            </p:txEl>
+                                          </p:spTgt>
+                                        </p:tgtEl>
+                                        <p:attrNameLst>
+                                          <p:attrName>ppt_y</p:attrName>
+                                        </p:attrNameLst>
+                                      </p:cBhvr>
+                                      <p:tavLst>
+                                        <p:tav tm="0">
+                                          <p:val>
+                                            <p:strVal val="1+#ppt_h/2"/>
+                                          </p:val>
+                                        </p:tav>
+                                        <p:tav tm="100000">
+                                          <p:val>
+                                            <p:strVal val="#ppt_y"/>
+                                          </p:val>
+                                        </p:tav>
+                                      </p:tavLst>
+                                    </p:anim>
+                                  </p:childTnLst>
+                                </p:cTn>
+                              </p:par>
+                            </p:childTnLst>
+                          </p:cTn>
+                        </p:par>
+                      </p:childTnLst>
+                    </p:cTn>
+                  </p:par>
+                  <p:par>
+                    <p:cTn id="15" fill="hold">
+                      <p:stCondLst>
+                        <p:cond delay="indefinite"/>
+                      </p:stCondLst>
+                      <p:childTnLst>
+                        <p:par>
+                          <p:cTn id="16" fill="hold">
+                            <p:stCondLst>
+                              <p:cond delay="0"/>
+                            </p:stCondLst>
+                            <p:childTnLst>
+                              <p:par>
+                                <p:cTn id="17" presetID="2" presetClass="entr" presetSubtype="4" fill="hold" nodeType="clickEffect">
+                                  <p:stCondLst>
+                                    <p:cond delay="0"/>
+                                  </p:stCondLst>
+                                  <p:childTnLst>
+                                    <p:set>
+                                      <p:cBhvr>
+                                        <p:cTn id="18" dur="1" fill="hold">
+                                          <p:stCondLst>
+                                            <p:cond delay="0"/>
+                                          </p:stCondLst>
+                                        </p:cTn>
+                                        <p:tgtEl>
+                                          <p:spTgt spid="3">
+                                            <p:txEl>
+                                              <p:pRg st="2" end="2"/>
+                                            </p:txEl>
+                                          </p:spTgt>
+                                        </p:tgtEl>
+                                        <p:attrNameLst>
+                                          <p:attrName>style.visibility</p:attrName>
+                                        </p:attrNameLst>
+                                      </p:cBhvr>
+                                      <p:to>
+                                        <p:strVal val="visible"/>
+                                      </p:to>
+                                    </p:set>
+                                    <p:anim calcmode="lin" valueType="num">
+                                      <p:cBhvr additive="base">
+                                        <p:cTn id="19" dur="500" fill="hold"/>
+                                        <p:tgtEl>
+                                          <p:spTgt spid="3">
+                                            <p:txEl>
+                                              <p:pRg st="2" end="2"/>
+                                            </p:txEl>
+                                          </p:spTgt>
+                                        </p:tgtEl>
+                                        <p:attrNameLst>
+                                          <p:attrName>ppt_x</p:attrName>
+                                        </p:attrNameLst>
+                                      </p:cBhvr>
+                                      <p:tavLst>
+                                        <p:tav tm="0">
+                                          <p:val>
+                                            <p:strVal val="#ppt_x"/>
+                                          </p:val>
+                                        </p:tav>
+                                        <p:tav tm="100000">
+                                          <p:val>
+                                            <p:strVal val="#ppt_x"/>
+                                          </p:val>
+                                        </p:tav>
+                                      </p:tavLst>
+                                    </p:anim>
+                                    <p:anim calcmode="lin" valueType="num">
+                                      <p:cBhvr additive="base">
+                                        <p:cTn id="20" dur="500" fill="hold"/>
+                                        <p:tgtEl>
+                                          <p:spTgt spid="3">
+                                            <p:txEl>
+                                              <p:pRg st="2" end="2"/>
+                                            </p:txEl>
+                                          </p:spTgt>
+                                        </p:tgtEl>
+                                        <p:attrNameLst>
+                                          <p:attrName>ppt_y</p:attrName>
+                                        </p:attrNameLst>
+                                      </p:cBhvr>
+                                      <p:tavLst>
+                                        <p:tav tm="0">
+                                          <p:val>
+                                            <p:strVal val="1+#ppt_h/2"/>
+                                          </p:val>
+                                        </p:tav>
+                                        <p:tav tm="100000">
+                                          <p:val>
+                                            <p:strVal val="#ppt_y"/>
+                                          </p:val>
+                                        </p:tav>
+                                      </p:tavLst>
+                                    </p:anim>
+                                  </p:childTnLst>
+                                </p:cTn>
+                              </p:par>
+                            </p:childTnLst>
+                          </p:cTn>
+                        </p:par>
+                      </p:childTnLst>
+                    </p:cTn>
+                  </p:par>
+                  <p:par>
+                    <p:cTn id="21" fill="hold">
+                      <p:stCondLst>
+                        <p:cond delay="indefinite"/>
+                      </p:stCondLst>
+                      <p:childTnLst>
+                        <p:par>
+                          <p:cTn id="22" fill="hold">
+                            <p:stCondLst>
+                              <p:cond delay="0"/>
+                            </p:stCondLst>
+                            <p:childTnLst>
+                              <p:par>
+                                <p:cTn id="23" presetID="2" presetClass="entr" presetSubtype="4" fill="hold" nodeType="clickEffect">
+                                  <p:stCondLst>
+                                    <p:cond delay="0"/>
+                                  </p:stCondLst>
+                                  <p:childTnLst>
+                                    <p:set>
+                                      <p:cBhvr>
+                                        <p:cTn id="24" dur="1" fill="hold">
+                                          <p:stCondLst>
+                                            <p:cond delay="0"/>
+                                          </p:stCondLst>
+                                        </p:cTn>
+                                        <p:tgtEl>
+                                          <p:spTgt spid="3">
+                                            <p:txEl>
+                                              <p:pRg st="3" end="3"/>
+                                            </p:txEl>
+                                          </p:spTgt>
+                                        </p:tgtEl>
+                                        <p:attrNameLst>
+                                          <p:attrName>style.visibility</p:attrName>
+                                        </p:attrNameLst>
+                                      </p:cBhvr>
+                                      <p:to>
+                                        <p:strVal val="visible"/>
+                                      </p:to>
+                                    </p:set>
+                                    <p:anim calcmode="lin" valueType="num">
+                                      <p:cBhvr additive="base">
+                                        <p:cTn id="25" dur="500" fill="hold"/>
+                                        <p:tgtEl>
+                                          <p:spTgt spid="3">
+                                            <p:txEl>
+                                              <p:pRg st="3" end="3"/>
+                                            </p:txEl>
+                                          </p:spTgt>
+                                        </p:tgtEl>
+                                        <p:attrNameLst>
+                                          <p:attrName>ppt_x</p:attrName>
+                                        </p:attrNameLst>
+                                      </p:cBhvr>
+                                      <p:tavLst>
+                                        <p:tav tm="0">
+                                          <p:val>
+                                            <p:strVal val="#ppt_x"/>
+                                          </p:val>
+                                        </p:tav>
+                                        <p:tav tm="100000">
+                                          <p:val>
+                                            <p:strVal val="#ppt_x"/>
+                                          </p:val>
+                                        </p:tav>
+                                      </p:tavLst>
+                                    </p:anim>
+                                    <p:anim calcmode="lin" valueType="num">
+                                      <p:cBhvr additive="base">
+                                        <p:cTn id="26" dur="500" fill="hold"/>
+                                        <p:tgtEl>
+                                          <p:spTgt spid="3">
+                                            <p:txEl>
+                                              <p:pRg st="3" end="3"/>
+                                            </p:txEl>
+                                          </p:spTgt>
+                                        </p:tgtEl>
+                                        <p:attrNameLst>
+                                          <p:attrName>ppt_y</p:attrName>
+                                        </p:attrNameLst>
+                                      </p:cBhvr>
+                                      <p:tavLst>
+                                        <p:tav tm="0">
+                                          <p:val>
+                                            <p:strVal val="1+#ppt_h/2"/>
+                                          </p:val>
+                                        </p:tav>
+                                        <p:tav tm="100000">
+                                          <p:val>
+                                            <p:strVal val="#ppt_y"/>
+                                          </p:val>
+                                        </p:tav>
+                                      </p:tavLst>
+                                    </p:anim>
+                                  </p:childTnLst>
+                                </p:cTn>
+                              </p:par>
+                            </p:childTnLst>
+                          </p:cTn>
+                        </p:par>
+                      </p:childTnLst>
+                    </p:cTn>
+                  </p:par>
+                </p:childTnLst>
+              </p:cTn>
+              <p:prevCondLst>
+                <p:cond evt="onPrev" delay="0">
+                  <p:tgtEl>
+                    <p:sldTgt/>
+                  </p:tgtEl>
+                </p:cond>
+              </p:prevCondLst>
+              <p:nextCondLst>
+                <p:cond evt="onNext" delay="0">
+                  <p:tgtEl>
+                    <p:sldTgt/>
+                  </p:tgtEl>
+                </p:cond>
+              </p:nextCondLst>
+            </p:seq>
+          </p:childTnLst>
+        </p:cTn>
+      </p:par>
+    </p:tnLst>
+  </p:timing>
 </p:sld>
 </file>
 
@@ -9075,6 +9856,398 @@
   <p:clrMapOvr>
     <a:masterClrMapping/>
   </p:clrMapOvr>
+  <p:timing>
+    <p:tnLst>
+      <p:par>
+        <p:cTn id="1" dur="indefinite" restart="never" nodeType="tmRoot">
+          <p:childTnLst>
+            <p:seq concurrent="1" nextAc="seek">
+              <p:cTn id="2" dur="indefinite" nodeType="mainSeq">
+                <p:childTnLst>
+                  <p:par>
+                    <p:cTn id="3" fill="hold">
+                      <p:stCondLst>
+                        <p:cond delay="indefinite"/>
+                      </p:stCondLst>
+                      <p:childTnLst>
+                        <p:par>
+                          <p:cTn id="4" fill="hold">
+                            <p:stCondLst>
+                              <p:cond delay="0"/>
+                            </p:stCondLst>
+                            <p:childTnLst>
+                              <p:par>
+                                <p:cTn id="5" presetID="2" presetClass="entr" presetSubtype="4" fill="hold" nodeType="clickEffect">
+                                  <p:stCondLst>
+                                    <p:cond delay="0"/>
+                                  </p:stCondLst>
+                                  <p:childTnLst>
+                                    <p:set>
+                                      <p:cBhvr>
+                                        <p:cTn id="6" dur="1" fill="hold">
+                                          <p:stCondLst>
+                                            <p:cond delay="0"/>
+                                          </p:stCondLst>
+                                        </p:cTn>
+                                        <p:tgtEl>
+                                          <p:spTgt spid="3">
+                                            <p:txEl>
+                                              <p:pRg st="0" end="0"/>
+                                            </p:txEl>
+                                          </p:spTgt>
+                                        </p:tgtEl>
+                                        <p:attrNameLst>
+                                          <p:attrName>style.visibility</p:attrName>
+                                        </p:attrNameLst>
+                                      </p:cBhvr>
+                                      <p:to>
+                                        <p:strVal val="visible"/>
+                                      </p:to>
+                                    </p:set>
+                                    <p:anim calcmode="lin" valueType="num">
+                                      <p:cBhvr additive="base">
+                                        <p:cTn id="7" dur="500" fill="hold"/>
+                                        <p:tgtEl>
+                                          <p:spTgt spid="3">
+                                            <p:txEl>
+                                              <p:pRg st="0" end="0"/>
+                                            </p:txEl>
+                                          </p:spTgt>
+                                        </p:tgtEl>
+                                        <p:attrNameLst>
+                                          <p:attrName>ppt_x</p:attrName>
+                                        </p:attrNameLst>
+                                      </p:cBhvr>
+                                      <p:tavLst>
+                                        <p:tav tm="0">
+                                          <p:val>
+                                            <p:strVal val="#ppt_x"/>
+                                          </p:val>
+                                        </p:tav>
+                                        <p:tav tm="100000">
+                                          <p:val>
+                                            <p:strVal val="#ppt_x"/>
+                                          </p:val>
+                                        </p:tav>
+                                      </p:tavLst>
+                                    </p:anim>
+                                    <p:anim calcmode="lin" valueType="num">
+                                      <p:cBhvr additive="base">
+                                        <p:cTn id="8" dur="500" fill="hold"/>
+                                        <p:tgtEl>
+                                          <p:spTgt spid="3">
+                                            <p:txEl>
+                                              <p:pRg st="0" end="0"/>
+                                            </p:txEl>
+                                          </p:spTgt>
+                                        </p:tgtEl>
+                                        <p:attrNameLst>
+                                          <p:attrName>ppt_y</p:attrName>
+                                        </p:attrNameLst>
+                                      </p:cBhvr>
+                                      <p:tavLst>
+                                        <p:tav tm="0">
+                                          <p:val>
+                                            <p:strVal val="1+#ppt_h/2"/>
+                                          </p:val>
+                                        </p:tav>
+                                        <p:tav tm="100000">
+                                          <p:val>
+                                            <p:strVal val="#ppt_y"/>
+                                          </p:val>
+                                        </p:tav>
+                                      </p:tavLst>
+                                    </p:anim>
+                                  </p:childTnLst>
+                                </p:cTn>
+                              </p:par>
+                            </p:childTnLst>
+                          </p:cTn>
+                        </p:par>
+                      </p:childTnLst>
+                    </p:cTn>
+                  </p:par>
+                  <p:par>
+                    <p:cTn id="9" fill="hold">
+                      <p:stCondLst>
+                        <p:cond delay="indefinite"/>
+                      </p:stCondLst>
+                      <p:childTnLst>
+                        <p:par>
+                          <p:cTn id="10" fill="hold">
+                            <p:stCondLst>
+                              <p:cond delay="0"/>
+                            </p:stCondLst>
+                            <p:childTnLst>
+                              <p:par>
+                                <p:cTn id="11" presetID="2" presetClass="entr" presetSubtype="4" fill="hold" nodeType="clickEffect">
+                                  <p:stCondLst>
+                                    <p:cond delay="0"/>
+                                  </p:stCondLst>
+                                  <p:childTnLst>
+                                    <p:set>
+                                      <p:cBhvr>
+                                        <p:cTn id="12" dur="1" fill="hold">
+                                          <p:stCondLst>
+                                            <p:cond delay="0"/>
+                                          </p:stCondLst>
+                                        </p:cTn>
+                                        <p:tgtEl>
+                                          <p:spTgt spid="3">
+                                            <p:txEl>
+                                              <p:pRg st="1" end="1"/>
+                                            </p:txEl>
+                                          </p:spTgt>
+                                        </p:tgtEl>
+                                        <p:attrNameLst>
+                                          <p:attrName>style.visibility</p:attrName>
+                                        </p:attrNameLst>
+                                      </p:cBhvr>
+                                      <p:to>
+                                        <p:strVal val="visible"/>
+                                      </p:to>
+                                    </p:set>
+                                    <p:anim calcmode="lin" valueType="num">
+                                      <p:cBhvr additive="base">
+                                        <p:cTn id="13" dur="500" fill="hold"/>
+                                        <p:tgtEl>
+                                          <p:spTgt spid="3">
+                                            <p:txEl>
+                                              <p:pRg st="1" end="1"/>
+                                            </p:txEl>
+                                          </p:spTgt>
+                                        </p:tgtEl>
+                                        <p:attrNameLst>
+                                          <p:attrName>ppt_x</p:attrName>
+                                        </p:attrNameLst>
+                                      </p:cBhvr>
+                                      <p:tavLst>
+                                        <p:tav tm="0">
+                                          <p:val>
+                                            <p:strVal val="#ppt_x"/>
+                                          </p:val>
+                                        </p:tav>
+                                        <p:tav tm="100000">
+                                          <p:val>
+                                            <p:strVal val="#ppt_x"/>
+                                          </p:val>
+                                        </p:tav>
+                                      </p:tavLst>
+                                    </p:anim>
+                                    <p:anim calcmode="lin" valueType="num">
+                                      <p:cBhvr additive="base">
+                                        <p:cTn id="14" dur="500" fill="hold"/>
+                                        <p:tgtEl>
+                                          <p:spTgt spid="3">
+                                            <p:txEl>
+                                              <p:pRg st="1" end="1"/>
+                                            </p:txEl>
+                                          </p:spTgt>
+                                        </p:tgtEl>
+                                        <p:attrNameLst>
+                                          <p:attrName>ppt_y</p:attrName>
+                                        </p:attrNameLst>
+                                      </p:cBhvr>
+                                      <p:tavLst>
+                                        <p:tav tm="0">
+                                          <p:val>
+                                            <p:strVal val="1+#ppt_h/2"/>
+                                          </p:val>
+                                        </p:tav>
+                                        <p:tav tm="100000">
+                                          <p:val>
+                                            <p:strVal val="#ppt_y"/>
+                                          </p:val>
+                                        </p:tav>
+                                      </p:tavLst>
+                                    </p:anim>
+                                  </p:childTnLst>
+                                </p:cTn>
+                              </p:par>
+                            </p:childTnLst>
+                          </p:cTn>
+                        </p:par>
+                      </p:childTnLst>
+                    </p:cTn>
+                  </p:par>
+                  <p:par>
+                    <p:cTn id="15" fill="hold">
+                      <p:stCondLst>
+                        <p:cond delay="indefinite"/>
+                      </p:stCondLst>
+                      <p:childTnLst>
+                        <p:par>
+                          <p:cTn id="16" fill="hold">
+                            <p:stCondLst>
+                              <p:cond delay="0"/>
+                            </p:stCondLst>
+                            <p:childTnLst>
+                              <p:par>
+                                <p:cTn id="17" presetID="2" presetClass="entr" presetSubtype="4" fill="hold" nodeType="clickEffect">
+                                  <p:stCondLst>
+                                    <p:cond delay="0"/>
+                                  </p:stCondLst>
+                                  <p:childTnLst>
+                                    <p:set>
+                                      <p:cBhvr>
+                                        <p:cTn id="18" dur="1" fill="hold">
+                                          <p:stCondLst>
+                                            <p:cond delay="0"/>
+                                          </p:stCondLst>
+                                        </p:cTn>
+                                        <p:tgtEl>
+                                          <p:spTgt spid="3">
+                                            <p:txEl>
+                                              <p:pRg st="2" end="2"/>
+                                            </p:txEl>
+                                          </p:spTgt>
+                                        </p:tgtEl>
+                                        <p:attrNameLst>
+                                          <p:attrName>style.visibility</p:attrName>
+                                        </p:attrNameLst>
+                                      </p:cBhvr>
+                                      <p:to>
+                                        <p:strVal val="visible"/>
+                                      </p:to>
+                                    </p:set>
+                                    <p:anim calcmode="lin" valueType="num">
+                                      <p:cBhvr additive="base">
+                                        <p:cTn id="19" dur="500" fill="hold"/>
+                                        <p:tgtEl>
+                                          <p:spTgt spid="3">
+                                            <p:txEl>
+                                              <p:pRg st="2" end="2"/>
+                                            </p:txEl>
+                                          </p:spTgt>
+                                        </p:tgtEl>
+                                        <p:attrNameLst>
+                                          <p:attrName>ppt_x</p:attrName>
+                                        </p:attrNameLst>
+                                      </p:cBhvr>
+                                      <p:tavLst>
+                                        <p:tav tm="0">
+                                          <p:val>
+                                            <p:strVal val="#ppt_x"/>
+                                          </p:val>
+                                        </p:tav>
+                                        <p:tav tm="100000">
+                                          <p:val>
+                                            <p:strVal val="#ppt_x"/>
+                                          </p:val>
+                                        </p:tav>
+                                      </p:tavLst>
+                                    </p:anim>
+                                    <p:anim calcmode="lin" valueType="num">
+                                      <p:cBhvr additive="base">
+                                        <p:cTn id="20" dur="500" fill="hold"/>
+                                        <p:tgtEl>
+                                          <p:spTgt spid="3">
+                                            <p:txEl>
+                                              <p:pRg st="2" end="2"/>
+                                            </p:txEl>
+                                          </p:spTgt>
+                                        </p:tgtEl>
+                                        <p:attrNameLst>
+                                          <p:attrName>ppt_y</p:attrName>
+                                        </p:attrNameLst>
+                                      </p:cBhvr>
+                                      <p:tavLst>
+                                        <p:tav tm="0">
+                                          <p:val>
+                                            <p:strVal val="1+#ppt_h/2"/>
+                                          </p:val>
+                                        </p:tav>
+                                        <p:tav tm="100000">
+                                          <p:val>
+                                            <p:strVal val="#ppt_y"/>
+                                          </p:val>
+                                        </p:tav>
+                                      </p:tavLst>
+                                    </p:anim>
+                                  </p:childTnLst>
+                                </p:cTn>
+                              </p:par>
+                            </p:childTnLst>
+                          </p:cTn>
+                        </p:par>
+                      </p:childTnLst>
+                    </p:cTn>
+                  </p:par>
+                  <p:par>
+                    <p:cTn id="21" fill="hold">
+                      <p:stCondLst>
+                        <p:cond delay="indefinite"/>
+                      </p:stCondLst>
+                      <p:childTnLst>
+                        <p:par>
+                          <p:cTn id="22" fill="hold">
+                            <p:stCondLst>
+                              <p:cond delay="0"/>
+                            </p:stCondLst>
+                            <p:childTnLst>
+                              <p:par>
+                                <p:cTn id="23" presetID="16" presetClass="entr" presetSubtype="21" fill="hold" nodeType="clickEffect">
+                                  <p:stCondLst>
+                                    <p:cond delay="0"/>
+                                  </p:stCondLst>
+                                  <p:childTnLst>
+                                    <p:set>
+                                      <p:cBhvr>
+                                        <p:cTn id="24" dur="1" fill="hold">
+                                          <p:stCondLst>
+                                            <p:cond delay="0"/>
+                                          </p:stCondLst>
+                                        </p:cTn>
+                                        <p:tgtEl>
+                                          <p:spTgt spid="7"/>
+                                        </p:tgtEl>
+                                        <p:attrNameLst>
+                                          <p:attrName>style.visibility</p:attrName>
+                                        </p:attrNameLst>
+                                      </p:cBhvr>
+                                      <p:to>
+                                        <p:strVal val="visible"/>
+                                      </p:to>
+                                    </p:set>
+                                    <p:animEffect transition="in" filter="barn(inVertical)">
+                                      <p:cBhvr>
+                                        <p:cTn id="25" dur="500"/>
+                                        <p:tgtEl>
+                                          <p:spTgt spid="7"/>
+                                        </p:tgtEl>
+                                      </p:cBhvr>
+                                    </p:animEffect>
+                                  </p:childTnLst>
+                                </p:cTn>
+                              </p:par>
+                            </p:childTnLst>
+                          </p:cTn>
+                        </p:par>
+                      </p:childTnLst>
+                    </p:cTn>
+                  </p:par>
+                </p:childTnLst>
+              </p:cTn>
+              <p:prevCondLst>
+                <p:cond evt="onPrev" delay="0">
+                  <p:tgtEl>
+                    <p:sldTgt/>
+                  </p:tgtEl>
+                </p:cond>
+              </p:prevCondLst>
+              <p:nextCondLst>
+                <p:cond evt="onNext" delay="0">
+                  <p:tgtEl>
+                    <p:sldTgt/>
+                  </p:tgtEl>
+                </p:cond>
+              </p:nextCondLst>
+            </p:seq>
+          </p:childTnLst>
+        </p:cTn>
+      </p:par>
+    </p:tnLst>
+  </p:timing>
 </p:sld>
 </file>
 
@@ -9213,6 +10386,345 @@
   <p:clrMapOvr>
     <a:masterClrMapping/>
   </p:clrMapOvr>
+  <p:timing>
+    <p:tnLst>
+      <p:par>
+        <p:cTn id="1" dur="indefinite" restart="never" nodeType="tmRoot">
+          <p:childTnLst>
+            <p:seq concurrent="1" nextAc="seek">
+              <p:cTn id="2" dur="indefinite" nodeType="mainSeq">
+                <p:childTnLst>
+                  <p:par>
+                    <p:cTn id="3" fill="hold">
+                      <p:stCondLst>
+                        <p:cond delay="indefinite"/>
+                      </p:stCondLst>
+                      <p:childTnLst>
+                        <p:par>
+                          <p:cTn id="4" fill="hold">
+                            <p:stCondLst>
+                              <p:cond delay="0"/>
+                            </p:stCondLst>
+                            <p:childTnLst>
+                              <p:par>
+                                <p:cTn id="5" presetID="2" presetClass="entr" presetSubtype="4" fill="hold" nodeType="clickEffect">
+                                  <p:stCondLst>
+                                    <p:cond delay="0"/>
+                                  </p:stCondLst>
+                                  <p:childTnLst>
+                                    <p:set>
+                                      <p:cBhvr>
+                                        <p:cTn id="6" dur="1" fill="hold">
+                                          <p:stCondLst>
+                                            <p:cond delay="0"/>
+                                          </p:stCondLst>
+                                        </p:cTn>
+                                        <p:tgtEl>
+                                          <p:spTgt spid="3">
+                                            <p:txEl>
+                                              <p:pRg st="0" end="0"/>
+                                            </p:txEl>
+                                          </p:spTgt>
+                                        </p:tgtEl>
+                                        <p:attrNameLst>
+                                          <p:attrName>style.visibility</p:attrName>
+                                        </p:attrNameLst>
+                                      </p:cBhvr>
+                                      <p:to>
+                                        <p:strVal val="visible"/>
+                                      </p:to>
+                                    </p:set>
+                                    <p:anim calcmode="lin" valueType="num">
+                                      <p:cBhvr additive="base">
+                                        <p:cTn id="7" dur="500" fill="hold"/>
+                                        <p:tgtEl>
+                                          <p:spTgt spid="3">
+                                            <p:txEl>
+                                              <p:pRg st="0" end="0"/>
+                                            </p:txEl>
+                                          </p:spTgt>
+                                        </p:tgtEl>
+                                        <p:attrNameLst>
+                                          <p:attrName>ppt_x</p:attrName>
+                                        </p:attrNameLst>
+                                      </p:cBhvr>
+                                      <p:tavLst>
+                                        <p:tav tm="0">
+                                          <p:val>
+                                            <p:strVal val="#ppt_x"/>
+                                          </p:val>
+                                        </p:tav>
+                                        <p:tav tm="100000">
+                                          <p:val>
+                                            <p:strVal val="#ppt_x"/>
+                                          </p:val>
+                                        </p:tav>
+                                      </p:tavLst>
+                                    </p:anim>
+                                    <p:anim calcmode="lin" valueType="num">
+                                      <p:cBhvr additive="base">
+                                        <p:cTn id="8" dur="500" fill="hold"/>
+                                        <p:tgtEl>
+                                          <p:spTgt spid="3">
+                                            <p:txEl>
+                                              <p:pRg st="0" end="0"/>
+                                            </p:txEl>
+                                          </p:spTgt>
+                                        </p:tgtEl>
+                                        <p:attrNameLst>
+                                          <p:attrName>ppt_y</p:attrName>
+                                        </p:attrNameLst>
+                                      </p:cBhvr>
+                                      <p:tavLst>
+                                        <p:tav tm="0">
+                                          <p:val>
+                                            <p:strVal val="1+#ppt_h/2"/>
+                                          </p:val>
+                                        </p:tav>
+                                        <p:tav tm="100000">
+                                          <p:val>
+                                            <p:strVal val="#ppt_y"/>
+                                          </p:val>
+                                        </p:tav>
+                                      </p:tavLst>
+                                    </p:anim>
+                                  </p:childTnLst>
+                                </p:cTn>
+                              </p:par>
+                            </p:childTnLst>
+                          </p:cTn>
+                        </p:par>
+                      </p:childTnLst>
+                    </p:cTn>
+                  </p:par>
+                  <p:par>
+                    <p:cTn id="9" fill="hold">
+                      <p:stCondLst>
+                        <p:cond delay="indefinite"/>
+                      </p:stCondLst>
+                      <p:childTnLst>
+                        <p:par>
+                          <p:cTn id="10" fill="hold">
+                            <p:stCondLst>
+                              <p:cond delay="0"/>
+                            </p:stCondLst>
+                            <p:childTnLst>
+                              <p:par>
+                                <p:cTn id="11" presetID="2" presetClass="entr" presetSubtype="4" fill="hold" nodeType="clickEffect">
+                                  <p:stCondLst>
+                                    <p:cond delay="0"/>
+                                  </p:stCondLst>
+                                  <p:childTnLst>
+                                    <p:set>
+                                      <p:cBhvr>
+                                        <p:cTn id="12" dur="1" fill="hold">
+                                          <p:stCondLst>
+                                            <p:cond delay="0"/>
+                                          </p:stCondLst>
+                                        </p:cTn>
+                                        <p:tgtEl>
+                                          <p:spTgt spid="3">
+                                            <p:txEl>
+                                              <p:pRg st="1" end="1"/>
+                                            </p:txEl>
+                                          </p:spTgt>
+                                        </p:tgtEl>
+                                        <p:attrNameLst>
+                                          <p:attrName>style.visibility</p:attrName>
+                                        </p:attrNameLst>
+                                      </p:cBhvr>
+                                      <p:to>
+                                        <p:strVal val="visible"/>
+                                      </p:to>
+                                    </p:set>
+                                    <p:anim calcmode="lin" valueType="num">
+                                      <p:cBhvr additive="base">
+                                        <p:cTn id="13" dur="500" fill="hold"/>
+                                        <p:tgtEl>
+                                          <p:spTgt spid="3">
+                                            <p:txEl>
+                                              <p:pRg st="1" end="1"/>
+                                            </p:txEl>
+                                          </p:spTgt>
+                                        </p:tgtEl>
+                                        <p:attrNameLst>
+                                          <p:attrName>ppt_x</p:attrName>
+                                        </p:attrNameLst>
+                                      </p:cBhvr>
+                                      <p:tavLst>
+                                        <p:tav tm="0">
+                                          <p:val>
+                                            <p:strVal val="#ppt_x"/>
+                                          </p:val>
+                                        </p:tav>
+                                        <p:tav tm="100000">
+                                          <p:val>
+                                            <p:strVal val="#ppt_x"/>
+                                          </p:val>
+                                        </p:tav>
+                                      </p:tavLst>
+                                    </p:anim>
+                                    <p:anim calcmode="lin" valueType="num">
+                                      <p:cBhvr additive="base">
+                                        <p:cTn id="14" dur="500" fill="hold"/>
+                                        <p:tgtEl>
+                                          <p:spTgt spid="3">
+                                            <p:txEl>
+                                              <p:pRg st="1" end="1"/>
+                                            </p:txEl>
+                                          </p:spTgt>
+                                        </p:tgtEl>
+                                        <p:attrNameLst>
+                                          <p:attrName>ppt_y</p:attrName>
+                                        </p:attrNameLst>
+                                      </p:cBhvr>
+                                      <p:tavLst>
+                                        <p:tav tm="0">
+                                          <p:val>
+                                            <p:strVal val="1+#ppt_h/2"/>
+                                          </p:val>
+                                        </p:tav>
+                                        <p:tav tm="100000">
+                                          <p:val>
+                                            <p:strVal val="#ppt_y"/>
+                                          </p:val>
+                                        </p:tav>
+                                      </p:tavLst>
+                                    </p:anim>
+                                  </p:childTnLst>
+                                </p:cTn>
+                              </p:par>
+                            </p:childTnLst>
+                          </p:cTn>
+                        </p:par>
+                      </p:childTnLst>
+                    </p:cTn>
+                  </p:par>
+                  <p:par>
+                    <p:cTn id="15" fill="hold">
+                      <p:stCondLst>
+                        <p:cond delay="indefinite"/>
+                      </p:stCondLst>
+                      <p:childTnLst>
+                        <p:par>
+                          <p:cTn id="16" fill="hold">
+                            <p:stCondLst>
+                              <p:cond delay="0"/>
+                            </p:stCondLst>
+                            <p:childTnLst>
+                              <p:par>
+                                <p:cTn id="17" presetID="2" presetClass="entr" presetSubtype="4" fill="hold" nodeType="clickEffect">
+                                  <p:stCondLst>
+                                    <p:cond delay="0"/>
+                                  </p:stCondLst>
+                                  <p:childTnLst>
+                                    <p:set>
+                                      <p:cBhvr>
+                                        <p:cTn id="18" dur="1" fill="hold">
+                                          <p:stCondLst>
+                                            <p:cond delay="0"/>
+                                          </p:stCondLst>
+                                        </p:cTn>
+                                        <p:tgtEl>
+                                          <p:spTgt spid="3">
+                                            <p:txEl>
+                                              <p:pRg st="2" end="2"/>
+                                            </p:txEl>
+                                          </p:spTgt>
+                                        </p:tgtEl>
+                                        <p:attrNameLst>
+                                          <p:attrName>style.visibility</p:attrName>
+                                        </p:attrNameLst>
+                                      </p:cBhvr>
+                                      <p:to>
+                                        <p:strVal val="visible"/>
+                                      </p:to>
+                                    </p:set>
+                                    <p:anim calcmode="lin" valueType="num">
+                                      <p:cBhvr additive="base">
+                                        <p:cTn id="19" dur="500" fill="hold"/>
+                                        <p:tgtEl>
+                                          <p:spTgt spid="3">
+                                            <p:txEl>
+                                              <p:pRg st="2" end="2"/>
+                                            </p:txEl>
+                                          </p:spTgt>
+                                        </p:tgtEl>
+                                        <p:attrNameLst>
+                                          <p:attrName>ppt_x</p:attrName>
+                                        </p:attrNameLst>
+                                      </p:cBhvr>
+                                      <p:tavLst>
+                                        <p:tav tm="0">
+                                          <p:val>
+                                            <p:strVal val="#ppt_x"/>
+                                          </p:val>
+                                        </p:tav>
+                                        <p:tav tm="100000">
+                                          <p:val>
+                                            <p:strVal val="#ppt_x"/>
+                                          </p:val>
+                                        </p:tav>
+                                      </p:tavLst>
+                                    </p:anim>
+                                    <p:anim calcmode="lin" valueType="num">
+                                      <p:cBhvr additive="base">
+                                        <p:cTn id="20" dur="500" fill="hold"/>
+                                        <p:tgtEl>
+                                          <p:spTgt spid="3">
+                                            <p:txEl>
+                                              <p:pRg st="2" end="2"/>
+                                            </p:txEl>
+                                          </p:spTgt>
+                                        </p:tgtEl>
+                                        <p:attrNameLst>
+                                          <p:attrName>ppt_y</p:attrName>
+                                        </p:attrNameLst>
+                                      </p:cBhvr>
+                                      <p:tavLst>
+                                        <p:tav tm="0">
+                                          <p:val>
+                                            <p:strVal val="1+#ppt_h/2"/>
+                                          </p:val>
+                                        </p:tav>
+                                        <p:tav tm="100000">
+                                          <p:val>
+                                            <p:strVal val="#ppt_y"/>
+                                          </p:val>
+                                        </p:tav>
+                                      </p:tavLst>
+                                    </p:anim>
+                                  </p:childTnLst>
+                                </p:cTn>
+                              </p:par>
+                            </p:childTnLst>
+                          </p:cTn>
+                        </p:par>
+                      </p:childTnLst>
+                    </p:cTn>
+                  </p:par>
+                </p:childTnLst>
+              </p:cTn>
+              <p:prevCondLst>
+                <p:cond evt="onPrev" delay="0">
+                  <p:tgtEl>
+                    <p:sldTgt/>
+                  </p:tgtEl>
+                </p:cond>
+              </p:prevCondLst>
+              <p:nextCondLst>
+                <p:cond evt="onNext" delay="0">
+                  <p:tgtEl>
+                    <p:sldTgt/>
+                  </p:tgtEl>
+                </p:cond>
+              </p:nextCondLst>
+            </p:seq>
+          </p:childTnLst>
+        </p:cTn>
+      </p:par>
+    </p:tnLst>
+  </p:timing>
 </p:sld>
 </file>
 
@@ -9348,6 +10860,140 @@
   <p:clrMapOvr>
     <a:masterClrMapping/>
   </p:clrMapOvr>
+  <p:timing>
+    <p:tnLst>
+      <p:par>
+        <p:cTn id="1" dur="indefinite" restart="never" nodeType="tmRoot">
+          <p:childTnLst>
+            <p:seq concurrent="1" nextAc="seek">
+              <p:cTn id="2" dur="indefinite" nodeType="mainSeq">
+                <p:childTnLst>
+                  <p:par>
+                    <p:cTn id="3" fill="hold">
+                      <p:stCondLst>
+                        <p:cond delay="indefinite"/>
+                      </p:stCondLst>
+                      <p:childTnLst>
+                        <p:par>
+                          <p:cTn id="4" fill="hold">
+                            <p:stCondLst>
+                              <p:cond delay="0"/>
+                            </p:stCondLst>
+                            <p:childTnLst>
+                              <p:par>
+                                <p:cTn id="5" presetID="42" presetClass="entr" presetSubtype="0" fill="hold" grpId="0" nodeType="clickEffect">
+                                  <p:stCondLst>
+                                    <p:cond delay="0"/>
+                                  </p:stCondLst>
+                                  <p:childTnLst>
+                                    <p:set>
+                                      <p:cBhvr>
+                                        <p:cTn id="6" dur="1" fill="hold">
+                                          <p:stCondLst>
+                                            <p:cond delay="0"/>
+                                          </p:stCondLst>
+                                        </p:cTn>
+                                        <p:tgtEl>
+                                          <p:spTgt spid="5"/>
+                                        </p:tgtEl>
+                                        <p:attrNameLst>
+                                          <p:attrName>style.visibility</p:attrName>
+                                        </p:attrNameLst>
+                                      </p:cBhvr>
+                                      <p:to>
+                                        <p:strVal val="visible"/>
+                                      </p:to>
+                                    </p:set>
+                                    <p:animEffect transition="in" filter="fade">
+                                      <p:cBhvr>
+                                        <p:cTn id="7" dur="1000"/>
+                                        <p:tgtEl>
+                                          <p:spTgt spid="5"/>
+                                        </p:tgtEl>
+                                      </p:cBhvr>
+                                    </p:animEffect>
+                                    <p:anim calcmode="lin" valueType="num">
+                                      <p:cBhvr>
+                                        <p:cTn id="8" dur="1000" fill="hold"/>
+                                        <p:tgtEl>
+                                          <p:spTgt spid="5"/>
+                                        </p:tgtEl>
+                                        <p:attrNameLst>
+                                          <p:attrName>ppt_x</p:attrName>
+                                        </p:attrNameLst>
+                                      </p:cBhvr>
+                                      <p:tavLst>
+                                        <p:tav tm="0">
+                                          <p:val>
+                                            <p:strVal val="#ppt_x"/>
+                                          </p:val>
+                                        </p:tav>
+                                        <p:tav tm="100000">
+                                          <p:val>
+                                            <p:strVal val="#ppt_x"/>
+                                          </p:val>
+                                        </p:tav>
+                                      </p:tavLst>
+                                    </p:anim>
+                                    <p:anim calcmode="lin" valueType="num">
+                                      <p:cBhvr>
+                                        <p:cTn id="9" dur="1000" fill="hold"/>
+                                        <p:tgtEl>
+                                          <p:spTgt spid="5"/>
+                                        </p:tgtEl>
+                                        <p:attrNameLst>
+                                          <p:attrName>ppt_y</p:attrName>
+                                        </p:attrNameLst>
+                                      </p:cBhvr>
+                                      <p:tavLst>
+                                        <p:tav tm="0">
+                                          <p:val>
+                                            <p:strVal val="#ppt_y+.1"/>
+                                          </p:val>
+                                        </p:tav>
+                                        <p:tav tm="100000">
+                                          <p:val>
+                                            <p:strVal val="#ppt_y"/>
+                                          </p:val>
+                                        </p:tav>
+                                      </p:tavLst>
+                                    </p:anim>
+                                  </p:childTnLst>
+                                </p:cTn>
+                              </p:par>
+                            </p:childTnLst>
+                          </p:cTn>
+                        </p:par>
+                      </p:childTnLst>
+                    </p:cTn>
+                  </p:par>
+                </p:childTnLst>
+              </p:cTn>
+              <p:prevCondLst>
+                <p:cond evt="onPrev" delay="0">
+                  <p:tgtEl>
+                    <p:sldTgt/>
+                  </p:tgtEl>
+                </p:cond>
+              </p:prevCondLst>
+              <p:nextCondLst>
+                <p:cond evt="onNext" delay="0">
+                  <p:tgtEl>
+                    <p:sldTgt/>
+                  </p:tgtEl>
+                </p:cond>
+              </p:nextCondLst>
+            </p:seq>
+          </p:childTnLst>
+        </p:cTn>
+      </p:par>
+    </p:tnLst>
+    <p:bldLst>
+      <p:bldGraphic spid="5" grpId="0">
+        <p:bldAsOne/>
+      </p:bldGraphic>
+    </p:bldLst>
+  </p:timing>
 </p:sld>
 </file>
 
@@ -9468,6 +11114,139 @@
   <p:clrMapOvr>
     <a:masterClrMapping/>
   </p:clrMapOvr>
+  <p:timing>
+    <p:tnLst>
+      <p:par>
+        <p:cTn id="1" dur="indefinite" restart="never" nodeType="tmRoot">
+          <p:childTnLst>
+            <p:seq concurrent="1" nextAc="seek">
+              <p:cTn id="2" dur="indefinite" nodeType="mainSeq">
+                <p:childTnLst>
+                  <p:par>
+                    <p:cTn id="3" fill="hold">
+                      <p:stCondLst>
+                        <p:cond delay="indefinite"/>
+                      </p:stCondLst>
+                      <p:childTnLst>
+                        <p:par>
+                          <p:cTn id="4" fill="hold">
+                            <p:stCondLst>
+                              <p:cond delay="0"/>
+                            </p:stCondLst>
+                            <p:childTnLst>
+                              <p:par>
+                                <p:cTn id="5" presetID="2" presetClass="entr" presetSubtype="4" fill="hold" nodeType="clickEffect">
+                                  <p:stCondLst>
+                                    <p:cond delay="0"/>
+                                  </p:stCondLst>
+                                  <p:childTnLst>
+                                    <p:set>
+                                      <p:cBhvr>
+                                        <p:cTn id="6" dur="1" fill="hold">
+                                          <p:stCondLst>
+                                            <p:cond delay="0"/>
+                                          </p:stCondLst>
+                                        </p:cTn>
+                                        <p:tgtEl>
+                                          <p:spTgt spid="3">
+                                            <p:txEl>
+                                              <p:pRg st="0" end="0"/>
+                                            </p:txEl>
+                                          </p:spTgt>
+                                        </p:tgtEl>
+                                        <p:attrNameLst>
+                                          <p:attrName>style.visibility</p:attrName>
+                                        </p:attrNameLst>
+                                      </p:cBhvr>
+                                      <p:to>
+                                        <p:strVal val="visible"/>
+                                      </p:to>
+                                    </p:set>
+                                    <p:anim calcmode="lin" valueType="num">
+                                      <p:cBhvr additive="base">
+                                        <p:cTn id="7" dur="500" fill="hold"/>
+                                        <p:tgtEl>
+                                          <p:spTgt spid="3">
+                                            <p:txEl>
+                                              <p:pRg st="0" end="0"/>
+                                            </p:txEl>
+                                          </p:spTgt>
+                                        </p:tgtEl>
+                                        <p:attrNameLst>
+                                          <p:attrName>ppt_x</p:attrName>
+                                        </p:attrNameLst>
+                                      </p:cBhvr>
+                                      <p:tavLst>
+                                        <p:tav tm="0">
+                                          <p:val>
+                                            <p:strVal val="#ppt_x"/>
+                                          </p:val>
+                                        </p:tav>
+                                        <p:tav tm="100000">
+                                          <p:val>
+                                            <p:strVal val="#ppt_x"/>
+                                          </p:val>
+                                        </p:tav>
+                                      </p:tavLst>
+                                    </p:anim>
+                                    <p:anim calcmode="lin" valueType="num">
+                                      <p:cBhvr additive="base">
+                                        <p:cTn id="8" dur="500" fill="hold"/>
+                                        <p:tgtEl>
+                                          <p:spTgt spid="3">
+                                            <p:txEl>
+                                              <p:pRg st="0" end="0"/>
+                                            </p:txEl>
+                                          </p:spTgt>
+                                        </p:tgtEl>
+                                        <p:attrNameLst>
+                                          <p:attrName>ppt_y</p:attrName>
+                                        </p:attrNameLst>
+                                      </p:cBhvr>
+                                      <p:tavLst>
+                                        <p:tav tm="0">
+                                          <p:val>
+                                            <p:strVal val="1+#ppt_h/2"/>
+                                          </p:val>
+                                        </p:tav>
+                                        <p:tav tm="100000">
+                                          <p:val>
+                                            <p:strVal val="#ppt_y"/>
+                                          </p:val>
+                                        </p:tav>
+                                      </p:tavLst>
+                                    </p:anim>
+                                  </p:childTnLst>
+                                </p:cTn>
+                              </p:par>
+                            </p:childTnLst>
+                          </p:cTn>
+                        </p:par>
+                      </p:childTnLst>
+                    </p:cTn>
+                  </p:par>
+                </p:childTnLst>
+              </p:cTn>
+              <p:prevCondLst>
+                <p:cond evt="onPrev" delay="0">
+                  <p:tgtEl>
+                    <p:sldTgt/>
+                  </p:tgtEl>
+                </p:cond>
+              </p:prevCondLst>
+              <p:nextCondLst>
+                <p:cond evt="onNext" delay="0">
+                  <p:tgtEl>
+                    <p:sldTgt/>
+                  </p:tgtEl>
+                </p:cond>
+              </p:nextCondLst>
+            </p:seq>
+          </p:childTnLst>
+        </p:cTn>
+      </p:par>
+    </p:tnLst>
+  </p:timing>
 </p:sld>
 </file>
 

</xml_diff>